<commit_message>
EricMarcon published a site update
</commit_message>
<xml_diff>
--- a/3-EspaceContinu.pptx
+++ b/3-EspaceContinu.pptx
@@ -4469,7 +4469,7 @@
             <a:fld id="{23E9B8FB-2ABD-42C9-A6DA-A6789EAF441D}" type="datetimeFigureOut">
               <a:rPr lang="fr-FR"/>
               <a:pPr/>
-              <a:t>17/06/2023</a:t>
+              <a:t>18/06/2023</a:t>
             </a:fld>
             <a:endParaRPr lang="fr-FR"/>
           </a:p>
@@ -5075,7 +5075,7 @@
                 </a:solidFill>
               </a:rPr>
               <a:pPr algn="r"/>
-              <a:t>17/06/2023</a:t>
+              <a:t>18/06/2023</a:t>
             </a:fld>
             <a:endParaRPr kumimoji="0" lang="fr-FR" dirty="0"/>
           </a:p>
@@ -5757,7 +5757,7 @@
                 </a:solidFill>
               </a:rPr>
               <a:pPr algn="r"/>
-              <a:t>17/06/2023</a:t>
+              <a:t>18/06/2023</a:t>
             </a:fld>
             <a:endParaRPr kumimoji="0" lang="fr-FR"/>
           </a:p>
@@ -5960,7 +5960,7 @@
             <a:fld id="{FA2A1E87-797C-4426-A581-8CBA072728F7}" type="datetime1">
               <a:rPr kumimoji="0" lang="fr-FR" smtClean="0"/>
               <a:pPr/>
-              <a:t>17/06/2023</a:t>
+              <a:t>18/06/2023</a:t>
             </a:fld>
             <a:endParaRPr kumimoji="0" lang="fr-FR"/>
           </a:p>
@@ -6166,7 +6166,7 @@
                 </a:solidFill>
               </a:rPr>
               <a:pPr algn="r"/>
-              <a:t>17/06/2023</a:t>
+              <a:t>18/06/2023</a:t>
             </a:fld>
             <a:endParaRPr kumimoji="0" lang="fr-FR"/>
           </a:p>
@@ -6414,7 +6414,7 @@
                 </a:solidFill>
               </a:rPr>
               <a:pPr algn="r"/>
-              <a:t>17/06/2023</a:t>
+              <a:t>18/06/2023</a:t>
             </a:fld>
             <a:endParaRPr kumimoji="0" lang="fr-FR"/>
           </a:p>
@@ -6749,7 +6749,7 @@
                 </a:solidFill>
               </a:rPr>
               <a:pPr algn="r"/>
-              <a:t>17/06/2023</a:t>
+              <a:t>18/06/2023</a:t>
             </a:fld>
             <a:endParaRPr kumimoji="0" lang="fr-FR"/>
           </a:p>
@@ -7040,7 +7040,7 @@
                 </a:solidFill>
               </a:rPr>
               <a:pPr algn="r"/>
-              <a:t>17/06/2023</a:t>
+              <a:t>18/06/2023</a:t>
             </a:fld>
             <a:endParaRPr kumimoji="0" lang="fr-FR">
               <a:solidFill>
@@ -7184,7 +7184,7 @@
                 </a:solidFill>
               </a:rPr>
               <a:pPr algn="r"/>
-              <a:t>17/06/2023</a:t>
+              <a:t>18/06/2023</a:t>
             </a:fld>
             <a:endParaRPr kumimoji="0" lang="fr-FR">
               <a:solidFill>
@@ -7291,7 +7291,7 @@
             <a:fld id="{C9F5D1B0-FF15-4F7C-9AC8-90EAE137F745}" type="datetime1">
               <a:rPr kumimoji="0" lang="fr-FR" smtClean="0"/>
               <a:pPr/>
-              <a:t>17/06/2023</a:t>
+              <a:t>18/06/2023</a:t>
             </a:fld>
             <a:endParaRPr kumimoji="0" lang="fr-FR"/>
           </a:p>
@@ -7608,7 +7608,7 @@
                 </a:solidFill>
               </a:rPr>
               <a:pPr algn="r"/>
-              <a:t>17/06/2023</a:t>
+              <a:t>18/06/2023</a:t>
             </a:fld>
             <a:endParaRPr kumimoji="0" lang="fr-FR" dirty="0">
               <a:solidFill>
@@ -8114,7 +8114,7 @@
                 </a:solidFill>
               </a:rPr>
               <a:pPr algn="r"/>
-              <a:t>17/06/2023</a:t>
+              <a:t>18/06/2023</a:t>
             </a:fld>
             <a:endParaRPr kumimoji="0" lang="fr-FR" dirty="0"/>
           </a:p>
@@ -8382,7 +8382,7 @@
                 </a:solidFill>
               </a:rPr>
               <a:pPr algn="r"/>
-              <a:t>17/06/2023</a:t>
+              <a:t>18/06/2023</a:t>
             </a:fld>
             <a:endParaRPr kumimoji="0" lang="fr-FR" dirty="0"/>
           </a:p>
@@ -8641,7 +8641,7 @@
                 </a:solidFill>
               </a:rPr>
               <a:pPr algn="r"/>
-              <a:t>17/06/2023</a:t>
+              <a:t>18/06/2023</a:t>
             </a:fld>
             <a:endParaRPr kumimoji="0" lang="fr-FR" dirty="0"/>
           </a:p>
@@ -8806,7 +8806,7 @@
                 </a:solidFill>
               </a:rPr>
               <a:pPr algn="r"/>
-              <a:t>17/06/2023</a:t>
+              <a:t>18/06/2023</a:t>
             </a:fld>
             <a:endParaRPr kumimoji="0" lang="fr-FR" dirty="0"/>
           </a:p>
@@ -9051,7 +9051,7 @@
                 </a:solidFill>
               </a:rPr>
               <a:pPr algn="r"/>
-              <a:t>17/06/2023</a:t>
+              <a:t>18/06/2023</a:t>
             </a:fld>
             <a:endParaRPr kumimoji="0" lang="fr-FR" dirty="0"/>
           </a:p>
@@ -9303,7 +9303,7 @@
                 </a:solidFill>
               </a:rPr>
               <a:pPr algn="r"/>
-              <a:t>17/06/2023</a:t>
+              <a:t>18/06/2023</a:t>
             </a:fld>
             <a:endParaRPr kumimoji="0" lang="fr-FR" dirty="0"/>
           </a:p>
@@ -9685,7 +9685,7 @@
                 </a:solidFill>
               </a:rPr>
               <a:pPr algn="r"/>
-              <a:t>17/06/2023</a:t>
+              <a:t>18/06/2023</a:t>
             </a:fld>
             <a:endParaRPr kumimoji="0" lang="fr-FR"/>
           </a:p>
@@ -9860,8 +9860,8 @@
           <a:chExt cx="0" cy="0"/>
         </a:xfrm>
       </p:grpSpPr>
-      <mc:AlternateContent xmlns:mc="http://schemas.openxmlformats.org/markup-compatibility/2006">
-        <mc:Choice xmlns:a14="http://schemas.microsoft.com/office/drawing/2010/main" Requires="a14">
+      <mc:AlternateContent xmlns:mc="http://schemas.openxmlformats.org/markup-compatibility/2006" xmlns:a14="http://schemas.microsoft.com/office/drawing/2010/main">
+        <mc:Choice Requires="a14">
           <p:sp>
             <p:nvSpPr>
               <p:cNvPr id="3" name="Espace réservé du texte 2"/>
@@ -10086,6 +10086,7 @@
                 </a:r>
               </a:p>
               <a:p>
+                <a:pPr/>
                 <a14:m>
                   <m:oMathPara xmlns:m="http://schemas.openxmlformats.org/officeDocument/2006/math">
                     <m:oMathParaPr>
@@ -10177,7 +10178,7 @@
             </p:txBody>
           </p:sp>
         </mc:Choice>
-        <mc:Fallback>
+        <mc:Fallback xmlns="">
           <p:sp>
             <p:nvSpPr>
               <p:cNvPr id="3" name="Espace réservé du texte 2"/>
@@ -10238,7 +10239,7 @@
                 </a:solidFill>
               </a:rPr>
               <a:pPr algn="r"/>
-              <a:t>17/06/2023</a:t>
+              <a:t>18/06/2023</a:t>
             </a:fld>
             <a:endParaRPr kumimoji="0" lang="fr-FR" dirty="0"/>
           </a:p>
@@ -10441,7 +10442,7 @@
                 </a:solidFill>
               </a:rPr>
               <a:pPr algn="r"/>
-              <a:t>17/06/2023</a:t>
+              <a:t>18/06/2023</a:t>
             </a:fld>
             <a:endParaRPr kumimoji="0" lang="fr-FR" dirty="0"/>
           </a:p>
@@ -10668,7 +10669,7 @@
                 </a:solidFill>
               </a:rPr>
               <a:pPr algn="r"/>
-              <a:t>17/06/2023</a:t>
+              <a:t>18/06/2023</a:t>
             </a:fld>
             <a:endParaRPr kumimoji="0" lang="fr-FR"/>
           </a:p>
@@ -11111,7 +11112,7 @@
             <a:fld id="{FA2A1E87-797C-4426-A581-8CBA072728F7}" type="datetime1">
               <a:rPr kumimoji="0" lang="fr-FR" smtClean="0"/>
               <a:pPr/>
-              <a:t>17/06/2023</a:t>
+              <a:t>18/06/2023</a:t>
             </a:fld>
             <a:endParaRPr kumimoji="0" lang="fr-FR"/>
           </a:p>
@@ -11372,7 +11373,7 @@
                 </a:solidFill>
               </a:rPr>
               <a:pPr algn="r"/>
-              <a:t>17/06/2023</a:t>
+              <a:t>18/06/2023</a:t>
             </a:fld>
             <a:endParaRPr kumimoji="0" lang="fr-FR" dirty="0"/>
           </a:p>
@@ -11634,7 +11635,7 @@
             <a:fld id="{FA2A1E87-797C-4426-A581-8CBA072728F7}" type="datetime1">
               <a:rPr kumimoji="0" lang="fr-FR" smtClean="0"/>
               <a:pPr/>
-              <a:t>17/06/2023</a:t>
+              <a:t>18/06/2023</a:t>
             </a:fld>
             <a:endParaRPr kumimoji="0" lang="fr-FR"/>
           </a:p>
@@ -11687,68 +11688,6 @@
           </a:p>
         </p:txBody>
       </p:sp>
-      <p:pic>
-        <p:nvPicPr>
-          <p:cNvPr id="7" name="Picture 5"/>
-          <p:cNvPicPr>
-            <a:picLocks noChangeAspect="1" noChangeArrowheads="1"/>
-          </p:cNvPicPr>
-          <p:nvPr/>
-        </p:nvPicPr>
-        <p:blipFill rotWithShape="1">
-          <a:blip r:embed="rId3" cstate="print">
-            <a:extLst>
-              <a:ext uri="{28A0092B-C50C-407E-A947-70E740481C1C}">
-                <a14:useLocalDpi xmlns:a14="http://schemas.microsoft.com/office/drawing/2010/main" val="0"/>
-              </a:ext>
-            </a:extLst>
-          </a:blip>
-          <a:srcRect t="-7053" b="-7053"/>
-          <a:stretch/>
-        </p:blipFill>
-        <p:spPr bwMode="auto">
-          <a:xfrm>
-            <a:off x="5724128" y="3861048"/>
-            <a:ext cx="2392412" cy="2434592"/>
-          </a:xfrm>
-          <a:prstGeom prst="rect">
-            <a:avLst/>
-          </a:prstGeom>
-          <a:noFill/>
-          <a:ln>
-            <a:noFill/>
-          </a:ln>
-          <a:effectLst/>
-          <a:extLst>
-            <a:ext uri="{909E8E84-426E-40DD-AFC4-6F175D3DCCD1}">
-              <a14:hiddenFill xmlns:a14="http://schemas.microsoft.com/office/drawing/2010/main">
-                <a:solidFill>
-                  <a:schemeClr val="accent1"/>
-                </a:solidFill>
-              </a14:hiddenFill>
-            </a:ext>
-            <a:ext uri="{91240B29-F687-4F45-9708-019B960494DF}">
-              <a14:hiddenLine xmlns:a14="http://schemas.microsoft.com/office/drawing/2010/main" w="9525">
-                <a:solidFill>
-                  <a:schemeClr val="tx1"/>
-                </a:solidFill>
-                <a:miter lim="800000"/>
-                <a:headEnd/>
-                <a:tailEnd/>
-              </a14:hiddenLine>
-            </a:ext>
-            <a:ext uri="{AF507438-7753-43E0-B8FC-AC1667EBCBE1}">
-              <a14:hiddenEffects xmlns:a14="http://schemas.microsoft.com/office/drawing/2010/main">
-                <a:effectLst>
-                  <a:outerShdw dist="35921" dir="2700000" algn="ctr" rotWithShape="0">
-                    <a:schemeClr val="bg2"/>
-                  </a:outerShdw>
-                </a:effectLst>
-              </a14:hiddenEffects>
-            </a:ext>
-          </a:extLst>
-        </p:spPr>
-      </p:pic>
     </p:spTree>
     <p:extLst>
       <p:ext uri="{BB962C8B-B14F-4D97-AF65-F5344CB8AC3E}">
@@ -11917,7 +11856,7 @@
             <a:fld id="{FA2A1E87-797C-4426-A581-8CBA072728F7}" type="datetime1">
               <a:rPr kumimoji="0" lang="fr-FR" smtClean="0"/>
               <a:pPr/>
-              <a:t>17/06/2023</a:t>
+              <a:t>18/06/2023</a:t>
             </a:fld>
             <a:endParaRPr kumimoji="0" lang="fr-FR"/>
           </a:p>
@@ -12200,7 +12139,7 @@
             <a:fld id="{FA2A1E87-797C-4426-A581-8CBA072728F7}" type="datetime1">
               <a:rPr kumimoji="0" lang="fr-FR" smtClean="0"/>
               <a:pPr/>
-              <a:t>17/06/2023</a:t>
+              <a:t>18/06/2023</a:t>
             </a:fld>
             <a:endParaRPr kumimoji="0" lang="fr-FR"/>
           </a:p>
@@ -12377,7 +12316,7 @@
             <p:ph idx="1"/>
             <p:extLst>
               <p:ext uri="{D42A27DB-BD31-4B8C-83A1-F6EECF244321}">
-                <p14:modId xmlns:p14="http://schemas.microsoft.com/office/powerpoint/2010/main" val="327565564"/>
+                <p14:modId xmlns:p14="http://schemas.microsoft.com/office/powerpoint/2010/main" val="1037146254"/>
               </p:ext>
             </p:extLst>
           </p:nvPr>
@@ -12989,26 +12928,7 @@
                     <a:bodyPr/>
                     <a:lstStyle/>
                     <a:p>
-                      <a:pPr algn="l">
-                        <a:lnSpc>
-                          <a:spcPct val="150000"/>
-                        </a:lnSpc>
-                        <a:spcBef>
-                          <a:spcPts val="600"/>
-                        </a:spcBef>
-                        <a:spcAft>
-                          <a:spcPts val="0"/>
-                        </a:spcAft>
-                      </a:pPr>
-                      <a:r>
-                        <a:rPr lang="fr-FR" sz="1600" dirty="0">
-                          <a:effectLst/>
-                        </a:rPr>
-                        <a:t>M de Marcon et Puech</a:t>
-                      </a:r>
-                    </a:p>
-                    <a:p>
-                      <a:pPr marL="0" marR="0" indent="0" algn="l" defTabSz="914400" rtl="0" eaLnBrk="1" fontAlgn="auto" latinLnBrk="0" hangingPunct="1">
+                      <a:pPr marL="0" marR="0" lvl="0" indent="0" algn="l" defTabSz="914400" rtl="0" eaLnBrk="1" fontAlgn="auto" latinLnBrk="0" hangingPunct="1">
                         <a:lnSpc>
                           <a:spcPct val="150000"/>
                         </a:lnSpc>
@@ -13029,7 +12949,19 @@
                         <a:rPr lang="fr-FR" sz="1600" dirty="0">
                           <a:effectLst/>
                         </a:rPr>
-                        <a:t>D de Diggle et </a:t>
+                        <a:t>D de </a:t>
+                      </a:r>
+                      <a:r>
+                        <a:rPr lang="fr-FR" sz="1600" dirty="0" err="1">
+                          <a:effectLst/>
+                        </a:rPr>
+                        <a:t>Diggle</a:t>
+                      </a:r>
+                      <a:r>
+                        <a:rPr lang="fr-FR" sz="1600" dirty="0">
+                          <a:effectLst/>
+                        </a:rPr>
+                        <a:t> et </a:t>
                       </a:r>
                       <a:r>
                         <a:rPr lang="fr-FR" sz="1600" dirty="0" err="1">
@@ -13040,6 +12972,25 @@
                       <a:endParaRPr lang="fr-FR" sz="1600" dirty="0">
                         <a:effectLst/>
                       </a:endParaRPr>
+                    </a:p>
+                    <a:p>
+                      <a:pPr algn="l">
+                        <a:lnSpc>
+                          <a:spcPct val="150000"/>
+                        </a:lnSpc>
+                        <a:spcBef>
+                          <a:spcPts val="600"/>
+                        </a:spcBef>
+                        <a:spcAft>
+                          <a:spcPts val="0"/>
+                        </a:spcAft>
+                      </a:pPr>
+                      <a:r>
+                        <a:rPr lang="fr-FR" sz="1600" dirty="0">
+                          <a:effectLst/>
+                        </a:rPr>
+                        <a:t>M de Marcon et Puech</a:t>
+                      </a:r>
                     </a:p>
                   </a:txBody>
                   <a:tcPr marL="60684" marR="60684" marT="0" marB="0"/>
@@ -13072,7 +13023,7 @@
             <a:fld id="{FA2A1E87-797C-4426-A581-8CBA072728F7}" type="datetime1">
               <a:rPr kumimoji="0" lang="fr-FR" smtClean="0"/>
               <a:pPr/>
-              <a:t>17/06/2023</a:t>
+              <a:t>18/06/2023</a:t>
             </a:fld>
             <a:endParaRPr kumimoji="0" lang="fr-FR"/>
           </a:p>
@@ -13519,7 +13470,7 @@
                 </a:solidFill>
               </a:rPr>
               <a:pPr algn="r"/>
-              <a:t>17/06/2023</a:t>
+              <a:t>18/06/2023</a:t>
             </a:fld>
             <a:endParaRPr kumimoji="0" lang="fr-FR"/>
           </a:p>
@@ -13699,7 +13650,7 @@
             <a:fld id="{FA2A1E87-797C-4426-A581-8CBA072728F7}" type="datetime1">
               <a:rPr kumimoji="0" lang="fr-FR" smtClean="0"/>
               <a:pPr/>
-              <a:t>17/06/2023</a:t>
+              <a:t>18/06/2023</a:t>
             </a:fld>
             <a:endParaRPr kumimoji="0" lang="fr-FR"/>
           </a:p>
@@ -13977,7 +13928,7 @@
             <a:fld id="{FA2A1E87-797C-4426-A581-8CBA072728F7}" type="datetime1">
               <a:rPr kumimoji="0" lang="fr-FR" smtClean="0"/>
               <a:pPr/>
-              <a:t>17/06/2023</a:t>
+              <a:t>18/06/2023</a:t>
             </a:fld>
             <a:endParaRPr kumimoji="0" lang="fr-FR"/>
           </a:p>
@@ -14162,7 +14113,7 @@
             <a:fld id="{11141EAA-6A2F-406A-B956-80F3B15ADF7A}" type="datetime1">
               <a:rPr kumimoji="0" lang="fr-FR" smtClean="0"/>
               <a:pPr/>
-              <a:t>17/06/2023</a:t>
+              <a:t>18/06/2023</a:t>
             </a:fld>
             <a:endParaRPr kumimoji="0" lang="fr-FR"/>
           </a:p>
@@ -14555,7 +14506,7 @@
             <a:fld id="{FA2A1E87-797C-4426-A581-8CBA072728F7}" type="datetime1">
               <a:rPr kumimoji="0" lang="fr-FR" smtClean="0"/>
               <a:pPr/>
-              <a:t>17/06/2023</a:t>
+              <a:t>18/06/2023</a:t>
             </a:fld>
             <a:endParaRPr kumimoji="0" lang="fr-FR"/>
           </a:p>
@@ -14822,7 +14773,7 @@
                 </a:solidFill>
               </a:rPr>
               <a:pPr algn="r"/>
-              <a:t>17/06/2023</a:t>
+              <a:t>18/06/2023</a:t>
             </a:fld>
             <a:endParaRPr kumimoji="0" lang="fr-FR" dirty="0"/>
           </a:p>
@@ -14978,7 +14929,7 @@
                 </a:solidFill>
               </a:rPr>
               <a:pPr algn="r"/>
-              <a:t>17/06/2023</a:t>
+              <a:t>18/06/2023</a:t>
             </a:fld>
             <a:endParaRPr kumimoji="0" lang="fr-FR" dirty="0"/>
           </a:p>
@@ -15148,7 +15099,7 @@
                 </a:solidFill>
               </a:rPr>
               <a:pPr algn="r"/>
-              <a:t>17/06/2023</a:t>
+              <a:t>18/06/2023</a:t>
             </a:fld>
             <a:endParaRPr kumimoji="0" lang="fr-FR" dirty="0"/>
           </a:p>
@@ -15326,7 +15277,7 @@
                 </a:solidFill>
               </a:rPr>
               <a:pPr algn="r"/>
-              <a:t>17/06/2023</a:t>
+              <a:t>18/06/2023</a:t>
             </a:fld>
             <a:endParaRPr kumimoji="0" lang="fr-FR" dirty="0"/>
           </a:p>
@@ -15548,7 +15499,7 @@
                 </a:solidFill>
               </a:rPr>
               <a:pPr algn="r"/>
-              <a:t>17/06/2023</a:t>
+              <a:t>18/06/2023</a:t>
             </a:fld>
             <a:endParaRPr kumimoji="0" lang="fr-FR" dirty="0"/>
           </a:p>

</xml_diff>